<commit_message>
add : python bulit-in function
</commit_message>
<xml_diff>
--- a/03/beom/Memory.pptx
+++ b/03/beom/Memory.pptx
@@ -114,6 +114,11 @@
       </a:defRPr>
     </a:lvl9pPr>
   </p:defaultTextStyle>
+  <p:extLst>
+    <p:ext uri="{EFAFB233-063F-42B5-8137-9DF3F51BA10A}">
+      <p15:sldGuideLst xmlns:p15="http://schemas.microsoft.com/office/powerpoint/2012/main"/>
+    </p:ext>
+  </p:extLst>
 </p:presentation>
 </file>
 
@@ -4018,7 +4023,7 @@
             </a:pPr>
             <a:r>
               <a:rPr lang="ko-KR" altLang="en-US" dirty="0"/>
-              <a:t>메모리 동작</a:t>
+              <a:t>메모리 동작방식</a:t>
             </a:r>
             <a:endParaRPr lang="en-US" altLang="ko-KR" dirty="0"/>
           </a:p>
@@ -4312,7 +4317,7 @@
         <p:spPr>
           <a:xfrm>
             <a:off x="771088" y="1557175"/>
-            <a:ext cx="10176545" cy="5078313"/>
+            <a:ext cx="10176545" cy="3693319"/>
           </a:xfrm>
           <a:prstGeom prst="rect">
             <a:avLst/>
@@ -4388,19 +4393,6 @@
               <a:rPr lang="en-US" altLang="ko-KR" dirty="0"/>
               <a:t>)</a:t>
             </a:r>
-            <a:r>
-              <a:rPr lang="ko-KR" altLang="en-US" dirty="0"/>
-              <a:t> </a:t>
-            </a:r>
-            <a:r>
-              <a:rPr lang="en-US" altLang="ko-KR" dirty="0"/>
-              <a:t>:</a:t>
-            </a:r>
-            <a:r>
-              <a:rPr lang="ko-KR" altLang="en-US" dirty="0"/>
-              <a:t> 다음에 수행될 명령어의 주소를 저장하는 레지스터</a:t>
-            </a:r>
-            <a:endParaRPr lang="en-US" altLang="ko-KR" dirty="0"/>
           </a:p>
           <a:p>
             <a:pPr marL="285750" indent="-285750">
@@ -4417,13 +4409,8 @@
             </a:r>
             <a:r>
               <a:rPr lang="en-US" altLang="ko-KR" dirty="0"/>
-              <a:t>) : </a:t>
-            </a:r>
-            <a:r>
-              <a:rPr lang="ko-KR" altLang="en-US" dirty="0"/>
-              <a:t>현재 실행 중인 명령을 기억하는 레지스터</a:t>
-            </a:r>
-            <a:endParaRPr lang="en-US" altLang="ko-KR" dirty="0"/>
+              <a:t>) </a:t>
+            </a:r>
           </a:p>
           <a:p>
             <a:pPr marL="285750" indent="-285750">
@@ -4440,13 +4427,8 @@
             </a:r>
             <a:r>
               <a:rPr lang="en-US" altLang="ko-KR" dirty="0"/>
-              <a:t>) : </a:t>
-            </a:r>
-            <a:r>
-              <a:rPr lang="ko-KR" altLang="en-US" dirty="0"/>
-              <a:t>메모리에서 가져올 데이터의 주소를 저장하는 레지스터</a:t>
-            </a:r>
-            <a:endParaRPr lang="en-US" altLang="ko-KR" dirty="0"/>
+              <a:t>)</a:t>
+            </a:r>
           </a:p>
           <a:p>
             <a:pPr marL="285750" indent="-285750">
@@ -4463,13 +4445,8 @@
             </a:r>
             <a:r>
               <a:rPr lang="en-US" altLang="ko-KR" dirty="0"/>
-              <a:t>) : </a:t>
-            </a:r>
-            <a:r>
-              <a:rPr lang="ko-KR" altLang="en-US" dirty="0"/>
-              <a:t>메모리에 기록되거나 메모리로부터 읽힐 데이터를 저장하는 레지스터</a:t>
-            </a:r>
-            <a:endParaRPr lang="en-US" altLang="ko-KR" dirty="0"/>
+              <a:t>)</a:t>
+            </a:r>
           </a:p>
           <a:p>
             <a:pPr marL="285750" indent="-285750">
@@ -4486,13 +4463,8 @@
             </a:r>
             <a:r>
               <a:rPr lang="en-US" altLang="ko-KR" dirty="0"/>
-              <a:t>) : </a:t>
-            </a:r>
-            <a:r>
-              <a:rPr lang="ko-KR" altLang="en-US" dirty="0"/>
-              <a:t>입출력 모듈의 주소를 가지고 있는 레지스터</a:t>
-            </a:r>
-            <a:endParaRPr lang="en-US" altLang="ko-KR" dirty="0"/>
+              <a:t>) </a:t>
+            </a:r>
           </a:p>
           <a:p>
             <a:pPr marL="285750" indent="-285750">
@@ -4509,13 +4481,8 @@
             </a:r>
             <a:r>
               <a:rPr lang="en-US" altLang="ko-KR" dirty="0"/>
-              <a:t>) : </a:t>
-            </a:r>
-            <a:r>
-              <a:rPr lang="ko-KR" altLang="en-US" dirty="0"/>
-              <a:t>입출력 모듈과 처리기 간의 교환하는 데이터를 저장하는 레지스터</a:t>
-            </a:r>
-            <a:endParaRPr lang="en-US" altLang="ko-KR" dirty="0"/>
+              <a:t>)</a:t>
+            </a:r>
           </a:p>
           <a:p>
             <a:pPr marL="285750" indent="-285750">
@@ -4524,45 +4491,8 @@
             </a:pPr>
             <a:r>
               <a:rPr lang="en-US" altLang="ko-KR" dirty="0"/>
-              <a:t>PSW(Program Status Word) : </a:t>
-            </a:r>
-            <a:r>
-              <a:rPr lang="ko-KR" altLang="en-US" dirty="0"/>
-              <a:t>여러 프로그램이 실행되면서 발생하는 상태를 저장하는 레지스터 </a:t>
-            </a:r>
-            <a:r>
-              <a:rPr lang="en-US" altLang="ko-KR" dirty="0"/>
-              <a:t>ex) </a:t>
-            </a:r>
-            <a:r>
-              <a:rPr lang="ko-KR" altLang="en-US" dirty="0"/>
-              <a:t>인터럽트 유</a:t>
-            </a:r>
-            <a:r>
-              <a:rPr lang="en-US" altLang="ko-KR" dirty="0"/>
-              <a:t>/</a:t>
-            </a:r>
-            <a:r>
-              <a:rPr lang="ko-KR" altLang="en-US" dirty="0"/>
-              <a:t>무 체크</a:t>
-            </a:r>
-            <a:r>
-              <a:rPr lang="en-US" altLang="ko-KR" dirty="0"/>
-              <a:t>, OS</a:t>
-            </a:r>
-            <a:r>
-              <a:rPr lang="ko-KR" altLang="en-US" dirty="0"/>
-              <a:t>프로그램이 실행 되고 있을 때 체크</a:t>
-            </a:r>
-            <a:r>
-              <a:rPr lang="en-US" altLang="ko-KR" dirty="0"/>
-              <a:t> </a:t>
-            </a:r>
-            <a:r>
-              <a:rPr lang="ko-KR" altLang="en-US" dirty="0"/>
-              <a:t>등</a:t>
-            </a:r>
-            <a:endParaRPr lang="en-US" altLang="ko-KR" dirty="0"/>
+              <a:t>PSW(Program Status Word)</a:t>
+            </a:r>
           </a:p>
           <a:p>
             <a:pPr marL="285750" indent="-285750">
@@ -4579,13 +4509,8 @@
             </a:r>
             <a:r>
               <a:rPr lang="en-US" altLang="ko-KR" dirty="0"/>
-              <a:t>) : </a:t>
-            </a:r>
-            <a:r>
-              <a:rPr lang="ko-KR" altLang="en-US" dirty="0"/>
-              <a:t>연산 결과를 일시적으로 저장하는 레지스터</a:t>
-            </a:r>
-            <a:endParaRPr lang="en-US" altLang="ko-KR" dirty="0"/>
+              <a:t>)</a:t>
+            </a:r>
           </a:p>
         </p:txBody>
       </p:sp>
@@ -6119,30 +6044,6 @@
                 </a:solidFill>
               </a:rPr>
               <a:t>명령서 주소 값</a:t>
-            </a:r>
-            <a:r>
-              <a:rPr lang="en-US" altLang="ko-KR" dirty="0">
-                <a:solidFill>
-                  <a:srgbClr val="FF0000"/>
-                </a:solidFill>
-              </a:rPr>
-              <a:t>(</a:t>
-            </a:r>
-            <a:r>
-              <a:rPr lang="ko-KR" altLang="en-US" dirty="0">
-                <a:solidFill>
-                  <a:srgbClr val="FF0000"/>
-                </a:solidFill>
-              </a:rPr>
-              <a:t>상대주소</a:t>
-            </a:r>
-            <a:r>
-              <a:rPr lang="en-US" altLang="ko-KR" dirty="0">
-                <a:solidFill>
-                  <a:srgbClr val="FF0000"/>
-                </a:solidFill>
-              </a:rPr>
-              <a:t>)</a:t>
             </a:r>
             <a:r>
               <a:rPr lang="ko-KR" altLang="en-US" dirty="0"/>

</xml_diff>

<commit_message>
fix : MMU Movement
</commit_message>
<xml_diff>
--- a/03/beom/Memory.pptx
+++ b/03/beom/Memory.pptx
@@ -269,7 +269,7 @@
           <a:p>
             <a:fld id="{35E87A9C-3629-4C00-B345-D33EEDCBC4E7}" type="datetimeFigureOut">
               <a:rPr lang="ko-KR" altLang="en-US" smtClean="0"/>
-              <a:t>2022-01-06</a:t>
+              <a:t>2022-01-07</a:t>
             </a:fld>
             <a:endParaRPr lang="ko-KR" altLang="en-US"/>
           </a:p>
@@ -467,7 +467,7 @@
           <a:p>
             <a:fld id="{35E87A9C-3629-4C00-B345-D33EEDCBC4E7}" type="datetimeFigureOut">
               <a:rPr lang="ko-KR" altLang="en-US" smtClean="0"/>
-              <a:t>2022-01-06</a:t>
+              <a:t>2022-01-07</a:t>
             </a:fld>
             <a:endParaRPr lang="ko-KR" altLang="en-US"/>
           </a:p>
@@ -675,7 +675,7 @@
           <a:p>
             <a:fld id="{35E87A9C-3629-4C00-B345-D33EEDCBC4E7}" type="datetimeFigureOut">
               <a:rPr lang="ko-KR" altLang="en-US" smtClean="0"/>
-              <a:t>2022-01-06</a:t>
+              <a:t>2022-01-07</a:t>
             </a:fld>
             <a:endParaRPr lang="ko-KR" altLang="en-US"/>
           </a:p>
@@ -873,7 +873,7 @@
           <a:p>
             <a:fld id="{35E87A9C-3629-4C00-B345-D33EEDCBC4E7}" type="datetimeFigureOut">
               <a:rPr lang="ko-KR" altLang="en-US" smtClean="0"/>
-              <a:t>2022-01-06</a:t>
+              <a:t>2022-01-07</a:t>
             </a:fld>
             <a:endParaRPr lang="ko-KR" altLang="en-US"/>
           </a:p>
@@ -1148,7 +1148,7 @@
           <a:p>
             <a:fld id="{35E87A9C-3629-4C00-B345-D33EEDCBC4E7}" type="datetimeFigureOut">
               <a:rPr lang="ko-KR" altLang="en-US" smtClean="0"/>
-              <a:t>2022-01-06</a:t>
+              <a:t>2022-01-07</a:t>
             </a:fld>
             <a:endParaRPr lang="ko-KR" altLang="en-US"/>
           </a:p>
@@ -1413,7 +1413,7 @@
           <a:p>
             <a:fld id="{35E87A9C-3629-4C00-B345-D33EEDCBC4E7}" type="datetimeFigureOut">
               <a:rPr lang="ko-KR" altLang="en-US" smtClean="0"/>
-              <a:t>2022-01-06</a:t>
+              <a:t>2022-01-07</a:t>
             </a:fld>
             <a:endParaRPr lang="ko-KR" altLang="en-US"/>
           </a:p>
@@ -1825,7 +1825,7 @@
           <a:p>
             <a:fld id="{35E87A9C-3629-4C00-B345-D33EEDCBC4E7}" type="datetimeFigureOut">
               <a:rPr lang="ko-KR" altLang="en-US" smtClean="0"/>
-              <a:t>2022-01-06</a:t>
+              <a:t>2022-01-07</a:t>
             </a:fld>
             <a:endParaRPr lang="ko-KR" altLang="en-US"/>
           </a:p>
@@ -1966,7 +1966,7 @@
           <a:p>
             <a:fld id="{35E87A9C-3629-4C00-B345-D33EEDCBC4E7}" type="datetimeFigureOut">
               <a:rPr lang="ko-KR" altLang="en-US" smtClean="0"/>
-              <a:t>2022-01-06</a:t>
+              <a:t>2022-01-07</a:t>
             </a:fld>
             <a:endParaRPr lang="ko-KR" altLang="en-US"/>
           </a:p>
@@ -2079,7 +2079,7 @@
           <a:p>
             <a:fld id="{35E87A9C-3629-4C00-B345-D33EEDCBC4E7}" type="datetimeFigureOut">
               <a:rPr lang="ko-KR" altLang="en-US" smtClean="0"/>
-              <a:t>2022-01-06</a:t>
+              <a:t>2022-01-07</a:t>
             </a:fld>
             <a:endParaRPr lang="ko-KR" altLang="en-US"/>
           </a:p>
@@ -2390,7 +2390,7 @@
           <a:p>
             <a:fld id="{35E87A9C-3629-4C00-B345-D33EEDCBC4E7}" type="datetimeFigureOut">
               <a:rPr lang="ko-KR" altLang="en-US" smtClean="0"/>
-              <a:t>2022-01-06</a:t>
+              <a:t>2022-01-07</a:t>
             </a:fld>
             <a:endParaRPr lang="ko-KR" altLang="en-US"/>
           </a:p>
@@ -2678,7 +2678,7 @@
           <a:p>
             <a:fld id="{35E87A9C-3629-4C00-B345-D33EEDCBC4E7}" type="datetimeFigureOut">
               <a:rPr lang="ko-KR" altLang="en-US" smtClean="0"/>
-              <a:t>2022-01-06</a:t>
+              <a:t>2022-01-07</a:t>
             </a:fld>
             <a:endParaRPr lang="ko-KR" altLang="en-US"/>
           </a:p>
@@ -2919,7 +2919,7 @@
           <a:p>
             <a:fld id="{35E87A9C-3629-4C00-B345-D33EEDCBC4E7}" type="datetimeFigureOut">
               <a:rPr lang="ko-KR" altLang="en-US" smtClean="0"/>
-              <a:t>2022-01-06</a:t>
+              <a:t>2022-01-07</a:t>
             </a:fld>
             <a:endParaRPr lang="ko-KR" altLang="en-US"/>
           </a:p>
@@ -3650,7 +3650,7 @@
         <p:spPr>
           <a:xfrm>
             <a:off x="6379828" y="1317375"/>
-            <a:ext cx="5272517" cy="4801314"/>
+            <a:ext cx="5272517" cy="5078313"/>
           </a:xfrm>
           <a:prstGeom prst="rect">
             <a:avLst/>
@@ -3669,7 +3669,7 @@
             </a:r>
             <a:r>
               <a:rPr lang="ko-KR" altLang="en-US" b="1" dirty="0"/>
-              <a:t>캐시</a:t>
+              <a:t>메모리공간</a:t>
             </a:r>
             <a:endParaRPr lang="en-US" altLang="ko-KR" b="1" dirty="0"/>
           </a:p>
@@ -3680,7 +3680,27 @@
             </a:r>
             <a:r>
               <a:rPr lang="ko-KR" altLang="en-US" b="1" dirty="0" err="1"/>
-              <a:t>메인메모리</a:t>
+              <a:t>디크스</a:t>
+            </a:r>
+            <a:r>
+              <a:rPr lang="ko-KR" altLang="en-US" b="1" dirty="0"/>
+              <a:t> 내 </a:t>
+            </a:r>
+            <a:r>
+              <a:rPr lang="ko-KR" altLang="en-US" b="1" dirty="0" err="1"/>
+              <a:t>스왑영역</a:t>
+            </a:r>
+            <a:r>
+              <a:rPr lang="en-US" altLang="ko-KR" b="1" dirty="0"/>
+              <a:t>(</a:t>
+            </a:r>
+            <a:r>
+              <a:rPr lang="ko-KR" altLang="en-US" b="1" dirty="0"/>
+              <a:t>디스크 매핑 공간</a:t>
+            </a:r>
+            <a:r>
+              <a:rPr lang="en-US" altLang="ko-KR" b="1"/>
+              <a:t>)</a:t>
             </a:r>
             <a:endParaRPr lang="en-US" altLang="ko-KR" b="1" dirty="0"/>
           </a:p>
@@ -3691,7 +3711,7 @@
             </a:r>
             <a:r>
               <a:rPr lang="ko-KR" altLang="en-US" b="1" dirty="0"/>
-              <a:t>보조기억장치</a:t>
+              <a:t>디스크 내 물리적 공간</a:t>
             </a:r>
             <a:endParaRPr lang="en-US" altLang="ko-KR" b="1" dirty="0"/>
           </a:p>

</xml_diff>